<commit_message>
update road address project creating to viite manual
</commit_message>
<xml_diff>
--- a/viite-UI/manual/Presentation7.pptx
+++ b/viite-UI/manual/Presentation7.pptx
@@ -241,7 +241,7 @@
           <a:p>
             <a:fld id="{29484815-BF86-4A37-B628-628D9F86D85E}" type="datetimeFigureOut">
               <a:rPr lang="en-US" smtClean="0"/>
-              <a:t>12/15/2016</a:t>
+              <a:t>5/8/2017</a:t>
             </a:fld>
             <a:endParaRPr lang="en-US"/>
           </a:p>
@@ -409,7 +409,7 @@
           <a:p>
             <a:fld id="{29484815-BF86-4A37-B628-628D9F86D85E}" type="datetimeFigureOut">
               <a:rPr lang="en-US" smtClean="0"/>
-              <a:t>12/15/2016</a:t>
+              <a:t>5/8/2017</a:t>
             </a:fld>
             <a:endParaRPr lang="en-US"/>
           </a:p>
@@ -587,7 +587,7 @@
           <a:p>
             <a:fld id="{29484815-BF86-4A37-B628-628D9F86D85E}" type="datetimeFigureOut">
               <a:rPr lang="en-US" smtClean="0"/>
-              <a:t>12/15/2016</a:t>
+              <a:t>5/8/2017</a:t>
             </a:fld>
             <a:endParaRPr lang="en-US"/>
           </a:p>
@@ -755,7 +755,7 @@
           <a:p>
             <a:fld id="{29484815-BF86-4A37-B628-628D9F86D85E}" type="datetimeFigureOut">
               <a:rPr lang="en-US" smtClean="0"/>
-              <a:t>12/15/2016</a:t>
+              <a:t>5/8/2017</a:t>
             </a:fld>
             <a:endParaRPr lang="en-US"/>
           </a:p>
@@ -1000,7 +1000,7 @@
           <a:p>
             <a:fld id="{29484815-BF86-4A37-B628-628D9F86D85E}" type="datetimeFigureOut">
               <a:rPr lang="en-US" smtClean="0"/>
-              <a:t>12/15/2016</a:t>
+              <a:t>5/8/2017</a:t>
             </a:fld>
             <a:endParaRPr lang="en-US"/>
           </a:p>
@@ -1229,7 +1229,7 @@
           <a:p>
             <a:fld id="{29484815-BF86-4A37-B628-628D9F86D85E}" type="datetimeFigureOut">
               <a:rPr lang="en-US" smtClean="0"/>
-              <a:t>12/15/2016</a:t>
+              <a:t>5/8/2017</a:t>
             </a:fld>
             <a:endParaRPr lang="en-US"/>
           </a:p>
@@ -1593,7 +1593,7 @@
           <a:p>
             <a:fld id="{29484815-BF86-4A37-B628-628D9F86D85E}" type="datetimeFigureOut">
               <a:rPr lang="en-US" smtClean="0"/>
-              <a:t>12/15/2016</a:t>
+              <a:t>5/8/2017</a:t>
             </a:fld>
             <a:endParaRPr lang="en-US"/>
           </a:p>
@@ -1710,7 +1710,7 @@
           <a:p>
             <a:fld id="{29484815-BF86-4A37-B628-628D9F86D85E}" type="datetimeFigureOut">
               <a:rPr lang="en-US" smtClean="0"/>
-              <a:t>12/15/2016</a:t>
+              <a:t>5/8/2017</a:t>
             </a:fld>
             <a:endParaRPr lang="en-US"/>
           </a:p>
@@ -1805,7 +1805,7 @@
           <a:p>
             <a:fld id="{29484815-BF86-4A37-B628-628D9F86D85E}" type="datetimeFigureOut">
               <a:rPr lang="en-US" smtClean="0"/>
-              <a:t>12/15/2016</a:t>
+              <a:t>5/8/2017</a:t>
             </a:fld>
             <a:endParaRPr lang="en-US"/>
           </a:p>
@@ -2080,7 +2080,7 @@
           <a:p>
             <a:fld id="{29484815-BF86-4A37-B628-628D9F86D85E}" type="datetimeFigureOut">
               <a:rPr lang="en-US" smtClean="0"/>
-              <a:t>12/15/2016</a:t>
+              <a:t>5/8/2017</a:t>
             </a:fld>
             <a:endParaRPr lang="en-US"/>
           </a:p>
@@ -2332,7 +2332,7 @@
           <a:p>
             <a:fld id="{29484815-BF86-4A37-B628-628D9F86D85E}" type="datetimeFigureOut">
               <a:rPr lang="en-US" smtClean="0"/>
-              <a:t>12/15/2016</a:t>
+              <a:t>5/8/2017</a:t>
             </a:fld>
             <a:endParaRPr lang="en-US"/>
           </a:p>
@@ -2543,7 +2543,7 @@
           <a:p>
             <a:fld id="{29484815-BF86-4A37-B628-628D9F86D85E}" type="datetimeFigureOut">
               <a:rPr lang="en-US" smtClean="0"/>
-              <a:t>12/15/2016</a:t>
+              <a:t>5/8/2017</a:t>
             </a:fld>
             <a:endParaRPr lang="en-US"/>
           </a:p>
@@ -2950,43 +2950,26 @@
       </p:grpSpPr>
       <p:pic>
         <p:nvPicPr>
-          <p:cNvPr id="1026" name="Picture 2" descr="U:\projektit\VIITE-testaus\digiroad2\viite-UI\manual\k12.JPG"/>
+          <p:cNvPr id="2" name="Picture 1"/>
           <p:cNvPicPr>
-            <a:picLocks noChangeAspect="1" noChangeArrowheads="1"/>
+            <a:picLocks noChangeAspect="1"/>
           </p:cNvPicPr>
           <p:nvPr/>
         </p:nvPicPr>
         <p:blipFill>
-          <a:blip r:embed="rId2">
-            <a:extLst>
-              <a:ext uri="{28A0092B-C50C-407E-A947-70E740481C1C}">
-                <a14:useLocalDpi xmlns:a14="http://schemas.microsoft.com/office/drawing/2010/main" val="0"/>
-              </a:ext>
-            </a:extLst>
-          </a:blip>
-          <a:srcRect/>
+          <a:blip r:embed="rId2"/>
           <a:stretch>
             <a:fillRect/>
           </a:stretch>
         </p:blipFill>
-        <p:spPr bwMode="auto">
+        <p:spPr>
           <a:xfrm>
-            <a:off x="0" y="0"/>
-            <a:ext cx="12192000" cy="6858000"/>
+            <a:off x="207600" y="0"/>
+            <a:ext cx="11776799" cy="6858000"/>
           </a:xfrm>
           <a:prstGeom prst="rect">
             <a:avLst/>
           </a:prstGeom>
-          <a:noFill/>
-          <a:extLst>
-            <a:ext uri="{909E8E84-426E-40DD-AFC4-6F175D3DCCD1}">
-              <a14:hiddenFill xmlns:a14="http://schemas.microsoft.com/office/drawing/2010/main">
-                <a:solidFill>
-                  <a:srgbClr val="FFFFFF"/>
-                </a:solidFill>
-              </a14:hiddenFill>
-            </a:ext>
-          </a:extLst>
         </p:spPr>
       </p:pic>
       <p:sp>
@@ -2997,7 +2980,7 @@
         </p:nvSpPr>
         <p:spPr>
           <a:xfrm>
-            <a:off x="6569242" y="3553328"/>
+            <a:off x="5638800" y="3737813"/>
             <a:ext cx="320842" cy="328863"/>
           </a:xfrm>
           <a:prstGeom prst="ellipse">
@@ -3055,7 +3038,7 @@
         </p:nvSpPr>
         <p:spPr>
           <a:xfrm>
-            <a:off x="9376611" y="1909011"/>
+            <a:off x="9464843" y="2045368"/>
             <a:ext cx="320842" cy="328863"/>
           </a:xfrm>
           <a:prstGeom prst="ellipse">

</xml_diff>